<commit_message>
ajout fichier optimisation draft
</commit_message>
<xml_diff>
--- a/Analyse/optimisationrapport.pptx
+++ b/Analyse/optimisationrapport.pptx
@@ -4087,7 +4087,7 @@
         <p:spPr>
           <a:xfrm>
             <a:off x="7011670" y="1770380"/>
-            <a:ext cx="4758055" cy="368300"/>
+            <a:ext cx="4758055" cy="2306955"/>
           </a:xfrm>
           <a:prstGeom prst="rect">
             <a:avLst/>
@@ -4101,7 +4101,14 @@
           <a:p>
             <a:r>
               <a:rPr lang="fr-FR" altLang="en-US"/>
-              <a:t>kjijroej</a:t>
+              <a:t>La correction des contrastes, la supression des mots clés cachés, l'amélioration de la structure du code ainsi que l'ajout d'aria label au niveau des liens a permis de corriger toutes les erreurs d'accessibilité.</a:t>
+            </a:r>
+            <a:endParaRPr lang="fr-FR" altLang="en-US"/>
+          </a:p>
+          <a:p>
+            <a:r>
+              <a:rPr lang="fr-FR" altLang="en-US"/>
+              <a:t>De plus afin d'améliorer la visibilité des différents élements, les fonds texturés ont été retirés.</a:t>
             </a:r>
             <a:endParaRPr lang="fr-FR" altLang="en-US"/>
           </a:p>
@@ -4356,7 +4363,7 @@
         <p:spPr>
           <a:xfrm>
             <a:off x="7871460" y="1520825"/>
-            <a:ext cx="4272915" cy="368300"/>
+            <a:ext cx="4272915" cy="1476375"/>
           </a:xfrm>
           <a:prstGeom prst="rect">
             <a:avLst/>
@@ -4370,7 +4377,7 @@
           <a:p>
             <a:r>
               <a:rPr lang="fr-FR" altLang="en-US"/>
-              <a:t>kjijroej</a:t>
+              <a:t>L'outils purify permet à la fois de nettoyer et minifier le code, ce qui permet de reduire fortement la taille des fichier. A titre d'exemple, la taille du fichier bootstrap.css a été réduit de 90%</a:t>
             </a:r>
             <a:endParaRPr lang="fr-FR" altLang="en-US"/>
           </a:p>
@@ -4651,8 +4658,8 @@
         </p:nvSpPr>
         <p:spPr>
           <a:xfrm>
-            <a:off x="3959860" y="4647565"/>
-            <a:ext cx="4272915" cy="368300"/>
+            <a:off x="3959860" y="4370705"/>
+            <a:ext cx="4272915" cy="922020"/>
           </a:xfrm>
           <a:prstGeom prst="rect">
             <a:avLst/>
@@ -4667,7 +4674,7 @@
             <a:pPr algn="l"/>
             <a:r>
               <a:rPr lang="fr-FR" altLang="en-US"/>
-              <a:t>kjijroej</a:t>
+              <a:t>La minification des fichier js a également permet de réduire de X% le poids des fichiers js</a:t>
             </a:r>
             <a:endParaRPr lang="fr-FR" altLang="en-US"/>
           </a:p>

</xml_diff>